<commit_message>
finished final presentation (needs review)
</commit_message>
<xml_diff>
--- a/Presentation/group3-final-presentation.pptx
+++ b/Presentation/group3-final-presentation.pptx
@@ -8,10 +8,15 @@
   <p:sldIdLst>
     <p:sldId id="271" r:id="rId3"/>
     <p:sldId id="378" r:id="rId4"/>
-    <p:sldId id="383" r:id="rId5"/>
-    <p:sldId id="384" r:id="rId6"/>
-    <p:sldId id="385" r:id="rId7"/>
-    <p:sldId id="386" r:id="rId8"/>
+    <p:sldId id="388" r:id="rId5"/>
+    <p:sldId id="387" r:id="rId6"/>
+    <p:sldId id="383" r:id="rId7"/>
+    <p:sldId id="384" r:id="rId8"/>
+    <p:sldId id="389" r:id="rId9"/>
+    <p:sldId id="385" r:id="rId10"/>
+    <p:sldId id="390" r:id="rId11"/>
+    <p:sldId id="391" r:id="rId12"/>
+    <p:sldId id="386" r:id="rId13"/>
   </p:sldIdLst>
   <p:sldSz cx="13004800" cy="9753600"/>
   <p:notesSz cx="6858000" cy="9144000"/>
@@ -1970,7 +1975,7 @@
           </a:lstStyle>
           <a:p>
             <a:pPr lvl="0"/>
-            <a:endParaRPr lang="en-US" noProof="0" smtClean="0">
+            <a:endParaRPr lang="en-US" noProof="0" dirty="0" smtClean="0">
               <a:sym typeface="Gill Sans Light" charset="0"/>
             </a:endParaRPr>
           </a:p>
@@ -3397,7 +3402,7 @@
           </a:lstStyle>
           <a:p>
             <a:pPr lvl="0"/>
-            <a:endParaRPr lang="en-US" noProof="0" smtClean="0">
+            <a:endParaRPr lang="en-US" noProof="0" dirty="0" smtClean="0">
               <a:sym typeface="Gill Sans Light" charset="0"/>
             </a:endParaRPr>
           </a:p>
@@ -4925,32 +4930,8 @@
               <a:defRPr/>
             </a:pPr>
             <a:r>
-              <a:rPr lang="en-US" sz="6100" dirty="0" err="1"/>
-              <a:t>K</a:t>
-            </a:r>
-            <a:r>
-              <a:rPr lang="en-US" sz="6100" dirty="0" err="1"/>
-              <a:t>inesiological</a:t>
-            </a:r>
-            <a:r>
               <a:rPr lang="en-US" sz="6100" dirty="0"/>
-              <a:t> control of </a:t>
-            </a:r>
-            <a:r>
-              <a:rPr lang="en-US" sz="6100" dirty="0" err="1"/>
-              <a:t>teleoperated</a:t>
-            </a:r>
-            <a:r>
-              <a:rPr lang="en-US" sz="6100" dirty="0"/>
-              <a:t> </a:t>
-            </a:r>
-            <a:r>
-              <a:rPr lang="en-US" sz="6100" dirty="0"/>
-              <a:t>robot </a:t>
-            </a:r>
-            <a:r>
-              <a:rPr lang="en-US" sz="6100" dirty="0"/>
-              <a:t>manipulators</a:t>
+              <a:t>Kinesiological control of teleoperated robot manipulators</a:t>
             </a:r>
             <a:endParaRPr lang="en-US" sz="6300" dirty="0">
               <a:latin typeface="+mn-lt"/>
@@ -4982,23 +4963,7 @@
             <a:pPr marL="0" indent="0" eaLnBrk="1" hangingPunct="1"/>
             <a:r>
               <a:rPr lang="en-US" altLang="en-US" sz="3200" i="1" dirty="0"/>
-              <a:t>Danny </a:t>
-            </a:r>
-            <a:r>
-              <a:rPr lang="en-US" altLang="en-US" sz="3200" i="1" dirty="0" err="1"/>
-              <a:t>Rakita</a:t>
-            </a:r>
-            <a:r>
-              <a:rPr lang="en-US" altLang="en-US" sz="3200" i="1" dirty="0"/>
-              <a:t>, Alper Sarikaya, Christopher </a:t>
-            </a:r>
-            <a:r>
-              <a:rPr lang="en-US" altLang="en-US" sz="3200" i="1" dirty="0" err="1"/>
-              <a:t>Bodden</a:t>
-            </a:r>
-            <a:r>
-              <a:rPr lang="en-US" altLang="en-US" sz="3200" i="1" dirty="0"/>
-              <a:t/>
+              <a:t>Danny Rakita, Alper Sarikaya, Christopher Bodden</a:t>
             </a:r>
             <a:br>
               <a:rPr lang="en-US" altLang="en-US" sz="3200" i="1" dirty="0"/>
@@ -5069,7 +5034,7 @@
           <a:bodyPr lIns="0" tIns="0" rIns="0" bIns="0"/>
           <a:lstStyle/>
           <a:p>
-            <a:endParaRPr lang="en-US"/>
+            <a:endParaRPr lang="en-US" dirty="0"/>
           </a:p>
         </p:txBody>
       </p:sp>
@@ -5086,6 +5051,460 @@
       </p:par>
     </p:tnLst>
   </p:timing>
+</p:sld>
+</file>
+
+<file path=ppt/slides/slide10.xml><?xml version="1.0" encoding="utf-8"?>
+<p:sld xmlns:a="http://schemas.openxmlformats.org/drawingml/2006/main" xmlns:r="http://schemas.openxmlformats.org/officeDocument/2006/relationships" xmlns:p="http://schemas.openxmlformats.org/presentationml/2006/main">
+  <p:cSld>
+    <p:spTree>
+      <p:nvGrpSpPr>
+        <p:cNvPr id="1" name=""/>
+        <p:cNvGrpSpPr/>
+        <p:nvPr/>
+      </p:nvGrpSpPr>
+      <p:grpSpPr>
+        <a:xfrm>
+          <a:off x="0" y="0"/>
+          <a:ext cx="0" cy="0"/>
+          <a:chOff x="0" y="0"/>
+          <a:chExt cx="0" cy="0"/>
+        </a:xfrm>
+      </p:grpSpPr>
+      <p:sp>
+        <p:nvSpPr>
+          <p:cNvPr id="2" name="Title 1"/>
+          <p:cNvSpPr>
+            <a:spLocks noGrp="1"/>
+          </p:cNvSpPr>
+          <p:nvPr>
+            <p:ph type="title"/>
+          </p:nvPr>
+        </p:nvSpPr>
+        <p:spPr/>
+        <p:txBody>
+          <a:bodyPr/>
+          <a:lstStyle/>
+          <a:p>
+            <a:r>
+              <a:rPr lang="en-US" dirty="0" smtClean="0"/>
+              <a:t>Discussion</a:t>
+            </a:r>
+            <a:endParaRPr lang="en-US" dirty="0"/>
+          </a:p>
+        </p:txBody>
+      </p:sp>
+      <p:sp>
+        <p:nvSpPr>
+          <p:cNvPr id="3" name="Content Placeholder 2"/>
+          <p:cNvSpPr>
+            <a:spLocks noGrp="1"/>
+          </p:cNvSpPr>
+          <p:nvPr>
+            <p:ph idx="1"/>
+          </p:nvPr>
+        </p:nvSpPr>
+        <p:spPr/>
+        <p:txBody>
+          <a:bodyPr/>
+          <a:lstStyle/>
+          <a:p>
+            <a:r>
+              <a:rPr lang="en-US" dirty="0" smtClean="0"/>
+              <a:t>We were able to provide some support for </a:t>
+            </a:r>
+            <a:r>
+              <a:rPr lang="en-US" b="1" dirty="0" smtClean="0"/>
+              <a:t>H1</a:t>
+            </a:r>
+            <a:r>
+              <a:rPr lang="en-US" dirty="0" smtClean="0"/>
+              <a:t> and limited support for </a:t>
+            </a:r>
+            <a:r>
+              <a:rPr lang="en-US" b="1" dirty="0" smtClean="0"/>
+              <a:t>H2</a:t>
+            </a:r>
+            <a:r>
+              <a:rPr lang="en-US" dirty="0" smtClean="0"/>
+              <a:t>.</a:t>
+            </a:r>
+          </a:p>
+          <a:p>
+            <a:r>
+              <a:rPr lang="en-US" dirty="0" smtClean="0"/>
+              <a:t>We learned that participants can use combined kinesiological + special function control and perceive it as well as joystick control.</a:t>
+            </a:r>
+          </a:p>
+          <a:p>
+            <a:r>
+              <a:rPr lang="en-US" dirty="0" smtClean="0"/>
+              <a:t>We learned that pure kinesiological control is not effective for tasks that robot actuators afford improved ability.</a:t>
+            </a:r>
+          </a:p>
+          <a:p>
+            <a:r>
+              <a:rPr lang="en-US" dirty="0" smtClean="0"/>
+              <a:t>Designers of retargeted control methods need to keep these additional capabilities in mind and provide them.</a:t>
+            </a:r>
+          </a:p>
+        </p:txBody>
+      </p:sp>
+    </p:spTree>
+    <p:extLst>
+      <p:ext uri="{BB962C8B-B14F-4D97-AF65-F5344CB8AC3E}">
+        <p14:creationId xmlns:p14="http://schemas.microsoft.com/office/powerpoint/2010/main" val="4048973599"/>
+      </p:ext>
+    </p:extLst>
+  </p:cSld>
+  <p:clrMapOvr>
+    <a:masterClrMapping/>
+  </p:clrMapOvr>
+  <p:transition/>
+</p:sld>
+</file>
+
+<file path=ppt/slides/slide11.xml><?xml version="1.0" encoding="utf-8"?>
+<p:sld xmlns:a="http://schemas.openxmlformats.org/drawingml/2006/main" xmlns:r="http://schemas.openxmlformats.org/officeDocument/2006/relationships" xmlns:p="http://schemas.openxmlformats.org/presentationml/2006/main">
+  <p:cSld>
+    <p:spTree>
+      <p:nvGrpSpPr>
+        <p:cNvPr id="1" name=""/>
+        <p:cNvGrpSpPr/>
+        <p:nvPr/>
+      </p:nvGrpSpPr>
+      <p:grpSpPr>
+        <a:xfrm>
+          <a:off x="0" y="0"/>
+          <a:ext cx="0" cy="0"/>
+          <a:chOff x="0" y="0"/>
+          <a:chExt cx="0" cy="0"/>
+        </a:xfrm>
+      </p:grpSpPr>
+      <p:sp>
+        <p:nvSpPr>
+          <p:cNvPr id="2" name="Title 1"/>
+          <p:cNvSpPr>
+            <a:spLocks noGrp="1"/>
+          </p:cNvSpPr>
+          <p:nvPr>
+            <p:ph type="ctrTitle"/>
+          </p:nvPr>
+        </p:nvSpPr>
+        <p:spPr/>
+        <p:txBody>
+          <a:bodyPr/>
+          <a:lstStyle/>
+          <a:p>
+            <a:r>
+              <a:rPr lang="en-US" sz="13800" dirty="0"/>
+              <a:t>Questions?</a:t>
+            </a:r>
+          </a:p>
+        </p:txBody>
+      </p:sp>
+      <p:sp>
+        <p:nvSpPr>
+          <p:cNvPr id="3" name="Subtitle 2"/>
+          <p:cNvSpPr>
+            <a:spLocks noGrp="1"/>
+          </p:cNvSpPr>
+          <p:nvPr>
+            <p:ph type="subTitle" idx="1"/>
+          </p:nvPr>
+        </p:nvSpPr>
+        <p:spPr>
+          <a:xfrm>
+            <a:off x="1951039" y="5070477"/>
+            <a:ext cx="9102725" cy="720723"/>
+          </a:xfrm>
+        </p:spPr>
+        <p:txBody>
+          <a:bodyPr/>
+          <a:lstStyle/>
+          <a:p>
+            <a:r>
+              <a:rPr lang="en-US" dirty="0" smtClean="0"/>
+              <a:t>Thanks for listening!</a:t>
+            </a:r>
+            <a:endParaRPr lang="en-US" dirty="0"/>
+          </a:p>
+        </p:txBody>
+      </p:sp>
+      <p:sp>
+        <p:nvSpPr>
+          <p:cNvPr id="4" name="Rectangle 2"/>
+          <p:cNvSpPr txBox="1">
+            <a:spLocks noChangeArrowheads="1"/>
+          </p:cNvSpPr>
+          <p:nvPr/>
+        </p:nvSpPr>
+        <p:spPr bwMode="auto">
+          <a:xfrm>
+            <a:off x="1625600" y="6584950"/>
+            <a:ext cx="9753600" cy="2654300"/>
+          </a:xfrm>
+          <a:prstGeom prst="rect">
+            <a:avLst/>
+          </a:prstGeom>
+          <a:noFill/>
+          <a:ln>
+            <a:noFill/>
+          </a:ln>
+          <a:effectLst/>
+          <a:extLst>
+            <a:ext uri="{909E8E84-426E-40dd-AFC4-6F175D3DCCD1}">
+              <a14:hiddenFill xmlns:a14="http://schemas.microsoft.com/office/drawing/2010/main" xmlns="">
+                <a:solidFill>
+                  <a:srgbClr val="FFFFFF"/>
+                </a:solidFill>
+              </a14:hiddenFill>
+            </a:ext>
+            <a:ext uri="{91240B29-F687-4f45-9708-019B960494DF}">
+              <a14:hiddenLine xmlns:a14="http://schemas.microsoft.com/office/drawing/2010/main" xmlns="" w="12700">
+                <a:solidFill>
+                  <a:srgbClr val="000000"/>
+                </a:solidFill>
+                <a:miter lim="800000"/>
+                <a:headEnd/>
+                <a:tailEnd/>
+              </a14:hiddenLine>
+            </a:ext>
+            <a:ext uri="{AF507438-7753-43e0-B8FC-AC1667EBCBE1}">
+              <a14:hiddenEffects xmlns:a14="http://schemas.microsoft.com/office/drawing/2010/main" xmlns="">
+                <a:effectLst>
+                  <a:outerShdw blurRad="63500" dist="38099" dir="2700000" algn="ctr" rotWithShape="0">
+                    <a:srgbClr val="000000">
+                      <a:alpha val="74998"/>
+                    </a:srgbClr>
+                  </a:outerShdw>
+                </a:effectLst>
+              </a14:hiddenEffects>
+            </a:ext>
+            <a:ext uri="{FAA26D3D-D897-4be2-8F04-BA451C77F1D7}">
+              <ma14:placeholderFlag xmlns:ma14="http://schemas.microsoft.com/office/mac/drawingml/2011/main" xmlns="" val="1"/>
+            </a:ext>
+          </a:extLst>
+        </p:spPr>
+        <p:txBody>
+          <a:bodyPr vert="horz" wrap="square" lIns="50800" tIns="50800" rIns="50800" bIns="50800" numCol="1" anchor="t" anchorCtr="0" compatLnSpc="1">
+            <a:prstTxWarp prst="textNoShape">
+              <a:avLst/>
+            </a:prstTxWarp>
+          </a:bodyPr>
+          <a:lstStyle>
+            <a:lvl1pPr marL="0" indent="0" algn="ctr" rtl="0" eaLnBrk="0" fontAlgn="base" hangingPunct="0">
+              <a:spcBef>
+                <a:spcPct val="0"/>
+              </a:spcBef>
+              <a:spcAft>
+                <a:spcPct val="0"/>
+              </a:spcAft>
+              <a:buNone/>
+              <a:defRPr sz="3800">
+                <a:solidFill>
+                  <a:schemeClr val="tx1"/>
+                </a:solidFill>
+                <a:latin typeface="+mn-lt"/>
+                <a:ea typeface="+mn-ea"/>
+                <a:cs typeface="+mn-cs"/>
+                <a:sym typeface="Gill Sans Light" charset="0"/>
+              </a:defRPr>
+            </a:lvl1pPr>
+            <a:lvl2pPr marL="457200" indent="0" algn="ctr" rtl="0" eaLnBrk="0" fontAlgn="base" hangingPunct="0">
+              <a:spcBef>
+                <a:spcPct val="0"/>
+              </a:spcBef>
+              <a:spcAft>
+                <a:spcPct val="0"/>
+              </a:spcAft>
+              <a:buNone/>
+              <a:defRPr sz="3200">
+                <a:solidFill>
+                  <a:schemeClr val="tx1"/>
+                </a:solidFill>
+                <a:latin typeface="+mn-lt"/>
+                <a:ea typeface="+mn-ea"/>
+                <a:cs typeface="+mn-cs"/>
+                <a:sym typeface="Gill Sans Light" charset="0"/>
+              </a:defRPr>
+            </a:lvl2pPr>
+            <a:lvl3pPr marL="914400" indent="0" algn="ctr" rtl="0" eaLnBrk="0" fontAlgn="base" hangingPunct="0">
+              <a:spcBef>
+                <a:spcPct val="0"/>
+              </a:spcBef>
+              <a:spcAft>
+                <a:spcPct val="0"/>
+              </a:spcAft>
+              <a:buNone/>
+              <a:defRPr sz="2800">
+                <a:solidFill>
+                  <a:schemeClr val="tx1"/>
+                </a:solidFill>
+                <a:latin typeface="+mn-lt"/>
+                <a:ea typeface="+mn-ea"/>
+                <a:cs typeface="+mn-cs"/>
+                <a:sym typeface="Gill Sans Light" charset="0"/>
+              </a:defRPr>
+            </a:lvl3pPr>
+            <a:lvl4pPr marL="1371600" indent="0" algn="ctr" rtl="0" eaLnBrk="0" fontAlgn="base" hangingPunct="0">
+              <a:spcBef>
+                <a:spcPct val="0"/>
+              </a:spcBef>
+              <a:spcAft>
+                <a:spcPct val="0"/>
+              </a:spcAft>
+              <a:buNone/>
+              <a:defRPr sz="2400">
+                <a:solidFill>
+                  <a:schemeClr val="tx1"/>
+                </a:solidFill>
+                <a:latin typeface="+mn-lt"/>
+                <a:ea typeface="+mn-ea"/>
+                <a:cs typeface="+mn-cs"/>
+                <a:sym typeface="Gill Sans Light" charset="0"/>
+              </a:defRPr>
+            </a:lvl4pPr>
+            <a:lvl5pPr marL="1828800" indent="0" algn="ctr" rtl="0" eaLnBrk="0" fontAlgn="base" hangingPunct="0">
+              <a:spcBef>
+                <a:spcPct val="0"/>
+              </a:spcBef>
+              <a:spcAft>
+                <a:spcPct val="0"/>
+              </a:spcAft>
+              <a:buNone/>
+              <a:defRPr sz="2400">
+                <a:solidFill>
+                  <a:schemeClr val="tx1"/>
+                </a:solidFill>
+                <a:latin typeface="+mn-lt"/>
+                <a:ea typeface="+mn-ea"/>
+                <a:cs typeface="+mn-cs"/>
+                <a:sym typeface="Gill Sans Light" charset="0"/>
+              </a:defRPr>
+            </a:lvl5pPr>
+            <a:lvl6pPr marL="2286000" indent="0" algn="ctr" rtl="0" fontAlgn="base">
+              <a:spcBef>
+                <a:spcPct val="0"/>
+              </a:spcBef>
+              <a:spcAft>
+                <a:spcPct val="0"/>
+              </a:spcAft>
+              <a:buNone/>
+              <a:defRPr sz="2400">
+                <a:solidFill>
+                  <a:schemeClr val="tx1"/>
+                </a:solidFill>
+                <a:latin typeface="+mn-lt"/>
+                <a:ea typeface="+mn-ea"/>
+                <a:cs typeface="+mn-cs"/>
+                <a:sym typeface="Gill Sans Light" charset="0"/>
+              </a:defRPr>
+            </a:lvl6pPr>
+            <a:lvl7pPr marL="2743200" indent="0" algn="ctr" rtl="0" fontAlgn="base">
+              <a:spcBef>
+                <a:spcPct val="0"/>
+              </a:spcBef>
+              <a:spcAft>
+                <a:spcPct val="0"/>
+              </a:spcAft>
+              <a:buNone/>
+              <a:defRPr sz="2400">
+                <a:solidFill>
+                  <a:schemeClr val="tx1"/>
+                </a:solidFill>
+                <a:latin typeface="+mn-lt"/>
+                <a:ea typeface="+mn-ea"/>
+                <a:cs typeface="+mn-cs"/>
+                <a:sym typeface="Gill Sans Light" charset="0"/>
+              </a:defRPr>
+            </a:lvl7pPr>
+            <a:lvl8pPr marL="3200400" indent="0" algn="ctr" rtl="0" fontAlgn="base">
+              <a:spcBef>
+                <a:spcPct val="0"/>
+              </a:spcBef>
+              <a:spcAft>
+                <a:spcPct val="0"/>
+              </a:spcAft>
+              <a:buNone/>
+              <a:defRPr sz="2400">
+                <a:solidFill>
+                  <a:schemeClr val="tx1"/>
+                </a:solidFill>
+                <a:latin typeface="+mn-lt"/>
+                <a:ea typeface="+mn-ea"/>
+                <a:cs typeface="+mn-cs"/>
+                <a:sym typeface="Gill Sans Light" charset="0"/>
+              </a:defRPr>
+            </a:lvl8pPr>
+            <a:lvl9pPr marL="3657600" indent="0" algn="ctr" rtl="0" fontAlgn="base">
+              <a:spcBef>
+                <a:spcPct val="0"/>
+              </a:spcBef>
+              <a:spcAft>
+                <a:spcPct val="0"/>
+              </a:spcAft>
+              <a:buNone/>
+              <a:defRPr sz="2400">
+                <a:solidFill>
+                  <a:schemeClr val="tx1"/>
+                </a:solidFill>
+                <a:latin typeface="+mn-lt"/>
+                <a:ea typeface="+mn-ea"/>
+                <a:cs typeface="+mn-cs"/>
+                <a:sym typeface="Gill Sans Light" charset="0"/>
+              </a:defRPr>
+            </a:lvl9pPr>
+          </a:lstStyle>
+          <a:p>
+            <a:pPr eaLnBrk="1" hangingPunct="1"/>
+            <a:r>
+              <a:rPr lang="en-US" altLang="en-US" sz="3200" i="1" kern="0" dirty="0" smtClean="0"/>
+              <a:t>Danny Rakita, Alper Sarikaya, Christopher Bodden</a:t>
+            </a:r>
+            <a:br>
+              <a:rPr lang="en-US" altLang="en-US" sz="3200" i="1" kern="0" dirty="0" smtClean="0"/>
+            </a:br>
+            <a:r>
+              <a:rPr lang="en-US" altLang="en-US" sz="2400" i="1" kern="0" dirty="0" smtClean="0"/>
+              <a:t>Department of Computer Sciences</a:t>
+            </a:r>
+          </a:p>
+          <a:p>
+            <a:pPr marL="0" lvl="2" eaLnBrk="1" hangingPunct="1"/>
+            <a:r>
+              <a:rPr lang="en-US" altLang="en-US" sz="2400" i="1" kern="0" dirty="0" smtClean="0"/>
+              <a:t>University of Wisconsin–Madison</a:t>
+            </a:r>
+          </a:p>
+          <a:p>
+            <a:pPr marL="0" lvl="3" eaLnBrk="1" hangingPunct="1"/>
+            <a:endParaRPr lang="en-US" altLang="en-US" kern="0" dirty="0" smtClean="0"/>
+          </a:p>
+          <a:p>
+            <a:pPr marL="0" lvl="3" eaLnBrk="1" hangingPunct="1"/>
+            <a:endParaRPr lang="en-US" altLang="en-US" kern="0" dirty="0" smtClean="0"/>
+          </a:p>
+          <a:p>
+            <a:pPr marL="0" lvl="3" eaLnBrk="1" hangingPunct="1"/>
+            <a:r>
+              <a:rPr lang="en-US" altLang="en-US" kern="0" dirty="0" smtClean="0"/>
+              <a:t>CS/Psych-770 Human-Computer Interaction</a:t>
+            </a:r>
+          </a:p>
+        </p:txBody>
+      </p:sp>
+    </p:spTree>
+    <p:extLst>
+      <p:ext uri="{BB962C8B-B14F-4D97-AF65-F5344CB8AC3E}">
+        <p14:creationId xmlns:p14="http://schemas.microsoft.com/office/powerpoint/2010/main" val="3318887079"/>
+      </p:ext>
+    </p:extLst>
+  </p:cSld>
+  <p:clrMapOvr>
+    <a:masterClrMapping/>
+  </p:clrMapOvr>
+  <p:transition/>
 </p:sld>
 </file>
 
@@ -5145,7 +5564,6 @@
               <a:rPr lang="en-US" sz="2400" dirty="0"/>
               <a:t>graphics</a:t>
             </a:r>
-            <a:endParaRPr lang="en-US" sz="2400" dirty="0"/>
           </a:p>
         </p:txBody>
       </p:sp>
@@ -5173,20 +5591,14 @@
           <a:p>
             <a:r>
               <a:rPr lang="en-US" sz="3600" dirty="0"/>
-              <a:t>Danny </a:t>
-            </a:r>
-            <a:r>
-              <a:rPr lang="en-US" sz="3600" dirty="0" err="1"/>
-              <a:t>Rakita</a:t>
-            </a:r>
-            <a:endParaRPr lang="en-US" sz="3600" dirty="0"/>
+              <a:t>Danny Rakita</a:t>
+            </a:r>
           </a:p>
           <a:p>
             <a:r>
               <a:rPr lang="en-US" sz="2400" dirty="0"/>
               <a:t>Animation, robotics</a:t>
             </a:r>
-            <a:endParaRPr lang="en-US" sz="2400" dirty="0"/>
           </a:p>
         </p:txBody>
       </p:sp>
@@ -5214,15 +5626,7 @@
           <a:p>
             <a:r>
               <a:rPr lang="en-US" altLang="en-US" sz="3600" dirty="0"/>
-              <a:t>Christopher </a:t>
-            </a:r>
-            <a:r>
-              <a:rPr lang="en-US" altLang="en-US" sz="3600" dirty="0" err="1"/>
-              <a:t>Bodden</a:t>
-            </a:r>
-            <a:r>
-              <a:rPr lang="en-US" altLang="en-US" sz="3600" dirty="0"/>
-              <a:t/>
+              <a:t>Christopher Bodden</a:t>
             </a:r>
             <a:br>
               <a:rPr lang="en-US" altLang="en-US" sz="3600" dirty="0"/>
@@ -5231,7 +5635,6 @@
               <a:rPr lang="en-US" sz="2400" dirty="0"/>
               <a:t>Robotics, animation</a:t>
             </a:r>
-            <a:endParaRPr lang="en-US" sz="2400" dirty="0"/>
           </a:p>
         </p:txBody>
       </p:sp>
@@ -5385,6 +5788,618 @@
       </p:grpSpPr>
       <p:sp>
         <p:nvSpPr>
+          <p:cNvPr id="2" name="Title 1"/>
+          <p:cNvSpPr>
+            <a:spLocks noGrp="1"/>
+          </p:cNvSpPr>
+          <p:nvPr>
+            <p:ph type="title"/>
+          </p:nvPr>
+        </p:nvSpPr>
+        <p:spPr/>
+        <p:txBody>
+          <a:bodyPr/>
+          <a:lstStyle/>
+          <a:p>
+            <a:r>
+              <a:rPr lang="en-US" dirty="0" smtClean="0"/>
+              <a:t>Motivation</a:t>
+            </a:r>
+            <a:endParaRPr lang="en-US" dirty="0"/>
+          </a:p>
+        </p:txBody>
+      </p:sp>
+      <p:sp>
+        <p:nvSpPr>
+          <p:cNvPr id="3" name="Text Placeholder 2"/>
+          <p:cNvSpPr>
+            <a:spLocks noGrp="1"/>
+          </p:cNvSpPr>
+          <p:nvPr>
+            <p:ph type="body" idx="1"/>
+          </p:nvPr>
+        </p:nvSpPr>
+        <p:spPr>
+          <a:xfrm>
+            <a:off x="650876" y="3814763"/>
+            <a:ext cx="5745163" cy="909637"/>
+          </a:xfrm>
+        </p:spPr>
+        <p:txBody>
+          <a:bodyPr/>
+          <a:lstStyle/>
+          <a:p>
+            <a:pPr algn="ctr"/>
+            <a:r>
+              <a:rPr lang="en-US" dirty="0" smtClean="0"/>
+              <a:t>Joystick / Knobs + Direct control</a:t>
+            </a:r>
+            <a:endParaRPr lang="en-US" dirty="0"/>
+          </a:p>
+        </p:txBody>
+      </p:sp>
+      <p:sp>
+        <p:nvSpPr>
+          <p:cNvPr id="5" name="Text Placeholder 4"/>
+          <p:cNvSpPr>
+            <a:spLocks noGrp="1"/>
+          </p:cNvSpPr>
+          <p:nvPr>
+            <p:ph type="body" sz="quarter" idx="3"/>
+          </p:nvPr>
+        </p:nvSpPr>
+        <p:spPr>
+          <a:xfrm>
+            <a:off x="6605589" y="3814763"/>
+            <a:ext cx="5748337" cy="909637"/>
+          </a:xfrm>
+        </p:spPr>
+        <p:txBody>
+          <a:bodyPr/>
+          <a:lstStyle/>
+          <a:p>
+            <a:pPr algn="ctr"/>
+            <a:r>
+              <a:rPr lang="en-US" dirty="0"/>
+              <a:t>Kinesiological </a:t>
+            </a:r>
+            <a:r>
+              <a:rPr lang="en-US" dirty="0" smtClean="0"/>
+              <a:t>control + Retargeting</a:t>
+            </a:r>
+            <a:endParaRPr lang="en-US" dirty="0"/>
+          </a:p>
+        </p:txBody>
+      </p:sp>
+      <p:grpSp>
+        <p:nvGrpSpPr>
+          <p:cNvPr id="6" name="Group 5"/>
+          <p:cNvGrpSpPr/>
+          <p:nvPr/>
+        </p:nvGrpSpPr>
+        <p:grpSpPr>
+          <a:xfrm>
+            <a:off x="2139768" y="4800600"/>
+            <a:ext cx="2767378" cy="3989952"/>
+            <a:chOff x="1244600" y="4064000"/>
+            <a:chExt cx="2767378" cy="3989952"/>
+          </a:xfrm>
+        </p:grpSpPr>
+        <p:pic>
+          <p:nvPicPr>
+            <p:cNvPr id="7" name="Picture 2" descr="http://images.fineartamerica.com/images-medium-large-5/space-shuttle-canadarm-robotic-arm-control-panel-john-straton.jpg"/>
+            <p:cNvPicPr>
+              <a:picLocks noChangeAspect="1" noChangeArrowheads="1"/>
+            </p:cNvPicPr>
+            <p:nvPr/>
+          </p:nvPicPr>
+          <p:blipFill>
+            <a:blip r:embed="rId2">
+              <a:extLst>
+                <a:ext uri="{28A0092B-C50C-407E-A947-70E740481C1C}">
+                  <a14:useLocalDpi xmlns:a14="http://schemas.microsoft.com/office/drawing/2010/main" val="0"/>
+                </a:ext>
+              </a:extLst>
+            </a:blip>
+            <a:srcRect/>
+            <a:stretch>
+              <a:fillRect/>
+            </a:stretch>
+          </p:blipFill>
+          <p:spPr bwMode="auto">
+            <a:xfrm>
+              <a:off x="1244600" y="5981493"/>
+              <a:ext cx="2767378" cy="2072459"/>
+            </a:xfrm>
+            <a:prstGeom prst="rect">
+              <a:avLst/>
+            </a:prstGeom>
+            <a:noFill/>
+            <a:extLst>
+              <a:ext uri="{909E8E84-426E-40DD-AFC4-6F175D3DCCD1}">
+                <a14:hiddenFill xmlns:a14="http://schemas.microsoft.com/office/drawing/2010/main">
+                  <a:solidFill>
+                    <a:srgbClr val="FFFFFF"/>
+                  </a:solidFill>
+                </a14:hiddenFill>
+              </a:ext>
+            </a:extLst>
+          </p:spPr>
+        </p:pic>
+        <p:pic>
+          <p:nvPicPr>
+            <p:cNvPr id="14" name="Picture 13"/>
+            <p:cNvPicPr>
+              <a:picLocks noChangeAspect="1"/>
+            </p:cNvPicPr>
+            <p:nvPr/>
+          </p:nvPicPr>
+          <p:blipFill>
+            <a:blip r:embed="rId3"/>
+            <a:stretch>
+              <a:fillRect/>
+            </a:stretch>
+          </p:blipFill>
+          <p:spPr>
+            <a:xfrm>
+              <a:off x="1244600" y="4064000"/>
+              <a:ext cx="2767378" cy="1917493"/>
+            </a:xfrm>
+            <a:prstGeom prst="rect">
+              <a:avLst/>
+            </a:prstGeom>
+          </p:spPr>
+        </p:pic>
+      </p:grpSp>
+      <p:pic>
+        <p:nvPicPr>
+          <p:cNvPr id="8" name="Content Placeholder 7"/>
+          <p:cNvPicPr>
+            <a:picLocks noGrp="1" noChangeAspect="1"/>
+          </p:cNvPicPr>
+          <p:nvPr>
+            <p:ph sz="quarter" idx="4"/>
+          </p:nvPr>
+        </p:nvPicPr>
+        <p:blipFill>
+          <a:blip r:embed="rId4">
+            <a:extLst>
+              <a:ext uri="{28A0092B-C50C-407E-A947-70E740481C1C}">
+                <a14:useLocalDpi xmlns:a14="http://schemas.microsoft.com/office/drawing/2010/main" val="0"/>
+              </a:ext>
+            </a:extLst>
+          </a:blip>
+          <a:stretch>
+            <a:fillRect/>
+          </a:stretch>
+        </p:blipFill>
+        <p:spPr>
+          <a:xfrm>
+            <a:off x="7874000" y="4800600"/>
+            <a:ext cx="2933700" cy="3911600"/>
+          </a:xfrm>
+        </p:spPr>
+      </p:pic>
+      <p:sp>
+        <p:nvSpPr>
+          <p:cNvPr id="12" name="Rectangle 2"/>
+          <p:cNvSpPr txBox="1">
+            <a:spLocks noChangeArrowheads="1"/>
+          </p:cNvSpPr>
+          <p:nvPr/>
+        </p:nvSpPr>
+        <p:spPr bwMode="auto">
+          <a:xfrm>
+            <a:off x="355600" y="1821070"/>
+            <a:ext cx="12293600" cy="2217530"/>
+          </a:xfrm>
+          <a:prstGeom prst="rect">
+            <a:avLst/>
+          </a:prstGeom>
+          <a:noFill/>
+          <a:ln>
+            <a:noFill/>
+          </a:ln>
+          <a:effectLst/>
+          <a:extLst>
+            <a:ext uri="{909E8E84-426E-40dd-AFC4-6F175D3DCCD1}">
+              <a14:hiddenFill xmlns:a14="http://schemas.microsoft.com/office/drawing/2010/main" xmlns="">
+                <a:solidFill>
+                  <a:srgbClr val="FFFFFF"/>
+                </a:solidFill>
+              </a14:hiddenFill>
+            </a:ext>
+            <a:ext uri="{91240B29-F687-4f45-9708-019B960494DF}">
+              <a14:hiddenLine xmlns:a14="http://schemas.microsoft.com/office/drawing/2010/main" xmlns="" w="12700">
+                <a:solidFill>
+                  <a:srgbClr val="000000"/>
+                </a:solidFill>
+                <a:miter lim="800000"/>
+                <a:headEnd/>
+                <a:tailEnd/>
+              </a14:hiddenLine>
+            </a:ext>
+            <a:ext uri="{AF507438-7753-43e0-B8FC-AC1667EBCBE1}">
+              <a14:hiddenEffects xmlns:a14="http://schemas.microsoft.com/office/drawing/2010/main" xmlns="">
+                <a:effectLst>
+                  <a:outerShdw blurRad="63500" dist="38099" dir="2700000" algn="ctr" rotWithShape="0">
+                    <a:srgbClr val="000000">
+                      <a:alpha val="74998"/>
+                    </a:srgbClr>
+                  </a:outerShdw>
+                </a:effectLst>
+              </a14:hiddenEffects>
+            </a:ext>
+            <a:ext uri="{FAA26D3D-D897-4be2-8F04-BA451C77F1D7}">
+              <ma14:placeholderFlag xmlns:ma14="http://schemas.microsoft.com/office/mac/drawingml/2011/main" xmlns="" val="1"/>
+            </a:ext>
+          </a:extLst>
+        </p:spPr>
+        <p:txBody>
+          <a:bodyPr vert="horz" wrap="square" lIns="50800" tIns="50800" rIns="50800" bIns="50800" numCol="1" anchor="t" anchorCtr="0" compatLnSpc="1">
+            <a:prstTxWarp prst="textNoShape">
+              <a:avLst/>
+            </a:prstTxWarp>
+          </a:bodyPr>
+          <a:lstStyle>
+            <a:lvl1pPr marL="0" indent="0" algn="l" rtl="0" eaLnBrk="0" fontAlgn="base" hangingPunct="0">
+              <a:spcBef>
+                <a:spcPts val="2400"/>
+              </a:spcBef>
+              <a:spcAft>
+                <a:spcPct val="0"/>
+              </a:spcAft>
+              <a:buNone/>
+              <a:defRPr sz="2400" b="1">
+                <a:solidFill>
+                  <a:srgbClr val="222526"/>
+                </a:solidFill>
+                <a:latin typeface="+mn-lt"/>
+                <a:ea typeface="+mn-ea"/>
+                <a:cs typeface="+mn-cs"/>
+                <a:sym typeface="Gill Sans Light" charset="0"/>
+              </a:defRPr>
+            </a:lvl1pPr>
+            <a:lvl2pPr marL="457200" indent="0" algn="l" rtl="0" eaLnBrk="0" fontAlgn="base" hangingPunct="0">
+              <a:spcBef>
+                <a:spcPts val="2400"/>
+              </a:spcBef>
+              <a:spcAft>
+                <a:spcPct val="0"/>
+              </a:spcAft>
+              <a:buNone/>
+              <a:defRPr sz="2000" b="1">
+                <a:solidFill>
+                  <a:srgbClr val="222526"/>
+                </a:solidFill>
+                <a:latin typeface="+mn-lt"/>
+                <a:ea typeface="+mn-ea"/>
+                <a:cs typeface="+mn-cs"/>
+                <a:sym typeface="Gill Sans Light" charset="0"/>
+              </a:defRPr>
+            </a:lvl2pPr>
+            <a:lvl3pPr marL="914400" indent="0" algn="l" rtl="0" eaLnBrk="0" fontAlgn="base" hangingPunct="0">
+              <a:spcBef>
+                <a:spcPts val="2400"/>
+              </a:spcBef>
+              <a:spcAft>
+                <a:spcPct val="0"/>
+              </a:spcAft>
+              <a:buNone/>
+              <a:defRPr sz="1800" b="1">
+                <a:solidFill>
+                  <a:srgbClr val="222526"/>
+                </a:solidFill>
+                <a:latin typeface="+mn-lt"/>
+                <a:ea typeface="+mn-ea"/>
+                <a:cs typeface="+mn-cs"/>
+                <a:sym typeface="Gill Sans Light" charset="0"/>
+              </a:defRPr>
+            </a:lvl3pPr>
+            <a:lvl4pPr marL="1371600" indent="0" algn="l" rtl="0" eaLnBrk="0" fontAlgn="base" hangingPunct="0">
+              <a:spcBef>
+                <a:spcPts val="2400"/>
+              </a:spcBef>
+              <a:spcAft>
+                <a:spcPct val="0"/>
+              </a:spcAft>
+              <a:buNone/>
+              <a:defRPr sz="1600" b="1">
+                <a:solidFill>
+                  <a:srgbClr val="222526"/>
+                </a:solidFill>
+                <a:latin typeface="+mn-lt"/>
+                <a:ea typeface="+mn-ea"/>
+                <a:cs typeface="+mn-cs"/>
+                <a:sym typeface="Gill Sans Light" charset="0"/>
+              </a:defRPr>
+            </a:lvl4pPr>
+            <a:lvl5pPr marL="1828800" indent="0" algn="l" rtl="0" eaLnBrk="0" fontAlgn="base" hangingPunct="0">
+              <a:spcBef>
+                <a:spcPts val="2400"/>
+              </a:spcBef>
+              <a:spcAft>
+                <a:spcPct val="0"/>
+              </a:spcAft>
+              <a:buNone/>
+              <a:defRPr sz="1600" b="1">
+                <a:solidFill>
+                  <a:srgbClr val="222526"/>
+                </a:solidFill>
+                <a:latin typeface="+mn-lt"/>
+                <a:ea typeface="+mn-ea"/>
+                <a:cs typeface="+mn-cs"/>
+                <a:sym typeface="Gill Sans Light" charset="0"/>
+              </a:defRPr>
+            </a:lvl5pPr>
+            <a:lvl6pPr marL="2286000" indent="0" algn="l" rtl="0" fontAlgn="base">
+              <a:spcBef>
+                <a:spcPts val="2400"/>
+              </a:spcBef>
+              <a:spcAft>
+                <a:spcPct val="0"/>
+              </a:spcAft>
+              <a:buNone/>
+              <a:defRPr sz="1600" b="1">
+                <a:solidFill>
+                  <a:srgbClr val="222526"/>
+                </a:solidFill>
+                <a:latin typeface="+mn-lt"/>
+                <a:ea typeface="+mn-ea"/>
+                <a:cs typeface="+mn-cs"/>
+                <a:sym typeface="Gill Sans Light" charset="0"/>
+              </a:defRPr>
+            </a:lvl6pPr>
+            <a:lvl7pPr marL="2743200" indent="0" algn="l" rtl="0" fontAlgn="base">
+              <a:spcBef>
+                <a:spcPts val="2400"/>
+              </a:spcBef>
+              <a:spcAft>
+                <a:spcPct val="0"/>
+              </a:spcAft>
+              <a:buNone/>
+              <a:defRPr sz="1600" b="1">
+                <a:solidFill>
+                  <a:srgbClr val="222526"/>
+                </a:solidFill>
+                <a:latin typeface="+mn-lt"/>
+                <a:ea typeface="+mn-ea"/>
+                <a:cs typeface="+mn-cs"/>
+                <a:sym typeface="Gill Sans Light" charset="0"/>
+              </a:defRPr>
+            </a:lvl7pPr>
+            <a:lvl8pPr marL="3200400" indent="0" algn="l" rtl="0" fontAlgn="base">
+              <a:spcBef>
+                <a:spcPts val="2400"/>
+              </a:spcBef>
+              <a:spcAft>
+                <a:spcPct val="0"/>
+              </a:spcAft>
+              <a:buNone/>
+              <a:defRPr sz="1600" b="1">
+                <a:solidFill>
+                  <a:srgbClr val="222526"/>
+                </a:solidFill>
+                <a:latin typeface="+mn-lt"/>
+                <a:ea typeface="+mn-ea"/>
+                <a:cs typeface="+mn-cs"/>
+                <a:sym typeface="Gill Sans Light" charset="0"/>
+              </a:defRPr>
+            </a:lvl8pPr>
+            <a:lvl9pPr marL="3657600" indent="0" algn="l" rtl="0" fontAlgn="base">
+              <a:spcBef>
+                <a:spcPts val="2400"/>
+              </a:spcBef>
+              <a:spcAft>
+                <a:spcPct val="0"/>
+              </a:spcAft>
+              <a:buNone/>
+              <a:defRPr sz="1600" b="1">
+                <a:solidFill>
+                  <a:srgbClr val="222526"/>
+                </a:solidFill>
+                <a:latin typeface="+mn-lt"/>
+                <a:ea typeface="+mn-ea"/>
+                <a:cs typeface="+mn-cs"/>
+                <a:sym typeface="Gill Sans Light" charset="0"/>
+              </a:defRPr>
+            </a:lvl9pPr>
+          </a:lstStyle>
+          <a:p>
+            <a:pPr eaLnBrk="1" hangingPunct="1">
+              <a:defRPr/>
+            </a:pPr>
+            <a:r>
+              <a:rPr lang="en-US" sz="3200" b="0" kern="0" dirty="0" smtClean="0"/>
+              <a:t>As telepresence becomes more pervasive, it would be advantageous to allow physical interaction with the environment. But what is the best control method? Traditionally robot arms are operated via joysticks and knobs.</a:t>
+            </a:r>
+          </a:p>
+          <a:p>
+            <a:pPr eaLnBrk="1" hangingPunct="1">
+              <a:defRPr/>
+            </a:pPr>
+            <a:endParaRPr lang="en-US" kern="0" dirty="0" smtClean="0"/>
+          </a:p>
+          <a:p>
+            <a:pPr eaLnBrk="1" hangingPunct="1">
+              <a:defRPr/>
+            </a:pPr>
+            <a:r>
+              <a:rPr lang="en-US" kern="0" dirty="0" smtClean="0"/>
+              <a:t> </a:t>
+            </a:r>
+          </a:p>
+        </p:txBody>
+      </p:sp>
+    </p:spTree>
+    <p:extLst>
+      <p:ext uri="{BB962C8B-B14F-4D97-AF65-F5344CB8AC3E}">
+        <p14:creationId xmlns:p14="http://schemas.microsoft.com/office/powerpoint/2010/main" val="1032074329"/>
+      </p:ext>
+    </p:extLst>
+  </p:cSld>
+  <p:clrMapOvr>
+    <a:masterClrMapping/>
+  </p:clrMapOvr>
+  <p:transition/>
+  <p:timing>
+    <p:tnLst>
+      <p:par>
+        <p:cTn id="1" dur="indefinite" restart="never" nodeType="tmRoot"/>
+      </p:par>
+    </p:tnLst>
+  </p:timing>
+</p:sld>
+</file>
+
+<file path=ppt/slides/slide4.xml><?xml version="1.0" encoding="utf-8"?>
+<p:sld xmlns:a="http://schemas.openxmlformats.org/drawingml/2006/main" xmlns:r="http://schemas.openxmlformats.org/officeDocument/2006/relationships" xmlns:p="http://schemas.openxmlformats.org/presentationml/2006/main">
+  <p:cSld>
+    <p:spTree>
+      <p:nvGrpSpPr>
+        <p:cNvPr id="1" name=""/>
+        <p:cNvGrpSpPr/>
+        <p:nvPr/>
+      </p:nvGrpSpPr>
+      <p:grpSpPr>
+        <a:xfrm>
+          <a:off x="0" y="0"/>
+          <a:ext cx="0" cy="0"/>
+          <a:chOff x="0" y="0"/>
+          <a:chExt cx="0" cy="0"/>
+        </a:xfrm>
+      </p:grpSpPr>
+      <p:sp>
+        <p:nvSpPr>
+          <p:cNvPr id="2" name="Title 1"/>
+          <p:cNvSpPr>
+            <a:spLocks noGrp="1"/>
+          </p:cNvSpPr>
+          <p:nvPr>
+            <p:ph type="title"/>
+          </p:nvPr>
+        </p:nvSpPr>
+        <p:spPr/>
+        <p:txBody>
+          <a:bodyPr/>
+          <a:lstStyle/>
+          <a:p>
+            <a:r>
+              <a:rPr lang="en-US" dirty="0" smtClean="0"/>
+              <a:t>Prior Works</a:t>
+            </a:r>
+            <a:endParaRPr lang="en-US" dirty="0"/>
+          </a:p>
+        </p:txBody>
+      </p:sp>
+      <p:sp>
+        <p:nvSpPr>
+          <p:cNvPr id="3" name="Content Placeholder 2"/>
+          <p:cNvSpPr>
+            <a:spLocks noGrp="1"/>
+          </p:cNvSpPr>
+          <p:nvPr>
+            <p:ph idx="1"/>
+          </p:nvPr>
+        </p:nvSpPr>
+        <p:spPr>
+          <a:xfrm>
+            <a:off x="355600" y="2133600"/>
+            <a:ext cx="12293600" cy="6845300"/>
+          </a:xfrm>
+        </p:spPr>
+        <p:txBody>
+          <a:bodyPr/>
+          <a:lstStyle/>
+          <a:p>
+            <a:pPr marL="0" indent="0"/>
+            <a:r>
+              <a:rPr lang="en-US" sz="3600" dirty="0" smtClean="0"/>
+              <a:t>Teleoperated robot implementations:</a:t>
+            </a:r>
+          </a:p>
+          <a:p>
+            <a:pPr marL="266700" lvl="2" indent="0"/>
+            <a:r>
+              <a:rPr lang="en-US" sz="2400" dirty="0" smtClean="0"/>
+              <a:t>Hokayem &amp; Spong [6] summarize 50 years on teleoperated robotic theory in their survey paper. The history ranges from mechanically controlled teleoperation to retargeting.</a:t>
+            </a:r>
+            <a:endParaRPr lang="en-US" sz="2400" dirty="0"/>
+          </a:p>
+          <a:p>
+            <a:pPr marL="0" indent="0"/>
+            <a:r>
+              <a:rPr lang="en-US" sz="3600" dirty="0" smtClean="0"/>
+              <a:t>Work On Retargeting Implementations:</a:t>
+            </a:r>
+          </a:p>
+          <a:p>
+            <a:pPr marL="266700" lvl="2" indent="0"/>
+            <a:r>
+              <a:rPr lang="en-US" sz="2400" dirty="0"/>
+              <a:t>In Animation: </a:t>
+            </a:r>
+            <a:r>
+              <a:rPr lang="en-US" sz="2400" dirty="0" smtClean="0"/>
+              <a:t>Gleicher [5] worked on adapting motion from one character to another.</a:t>
+            </a:r>
+          </a:p>
+          <a:p>
+            <a:pPr marL="266700" lvl="2" indent="0"/>
+            <a:r>
+              <a:rPr lang="en-US" sz="2400" dirty="0" smtClean="0"/>
+              <a:t>In Robotics: Dragan et al. [1], Yang et al. [2], and Park et al. [3] have explored implementations of retargeting human arm motion to robots using various sensors (Kinect, data gloves, etc.).</a:t>
+            </a:r>
+          </a:p>
+          <a:p>
+            <a:pPr marL="0" indent="0"/>
+            <a:r>
+              <a:rPr lang="en-US" sz="3600" dirty="0" smtClean="0"/>
+              <a:t>Studies of interfaces for novice users:</a:t>
+            </a:r>
+          </a:p>
+          <a:p>
+            <a:pPr marL="266700" lvl="2" indent="0"/>
+            <a:r>
+              <a:rPr lang="en-US" sz="2400" dirty="0" smtClean="0"/>
+              <a:t>Labonte et al. [4] have studied the effects of different display modalities on teleoperation performance for novice users.</a:t>
+            </a:r>
+          </a:p>
+        </p:txBody>
+      </p:sp>
+    </p:spTree>
+    <p:extLst>
+      <p:ext uri="{BB962C8B-B14F-4D97-AF65-F5344CB8AC3E}">
+        <p14:creationId xmlns:p14="http://schemas.microsoft.com/office/powerpoint/2010/main" val="2882427427"/>
+      </p:ext>
+    </p:extLst>
+  </p:cSld>
+  <p:clrMapOvr>
+    <a:masterClrMapping/>
+  </p:clrMapOvr>
+  <p:transition/>
+</p:sld>
+</file>
+
+<file path=ppt/slides/slide5.xml><?xml version="1.0" encoding="utf-8"?>
+<p:sld xmlns:a="http://schemas.openxmlformats.org/drawingml/2006/main" xmlns:r="http://schemas.openxmlformats.org/officeDocument/2006/relationships" xmlns:p="http://schemas.openxmlformats.org/presentationml/2006/main">
+  <p:cSld>
+    <p:spTree>
+      <p:nvGrpSpPr>
+        <p:cNvPr id="1" name=""/>
+        <p:cNvGrpSpPr/>
+        <p:nvPr/>
+      </p:nvGrpSpPr>
+      <p:grpSpPr>
+        <a:xfrm>
+          <a:off x="0" y="0"/>
+          <a:ext cx="0" cy="0"/>
+          <a:chOff x="0" y="0"/>
+          <a:chExt cx="0" cy="0"/>
+        </a:xfrm>
+      </p:grpSpPr>
+      <p:sp>
+        <p:nvSpPr>
           <p:cNvPr id="9217" name="Rectangle 1"/>
           <p:cNvSpPr>
             <a:spLocks noGrp="1" noChangeArrowheads="1"/>
@@ -5438,27 +6453,7 @@
             </a:pPr>
             <a:r>
               <a:rPr lang="en-US" sz="3200" dirty="0"/>
-              <a:t>What is the effect </a:t>
-            </a:r>
-            <a:r>
-              <a:rPr lang="en-US" sz="3200" dirty="0"/>
-              <a:t>of </a:t>
-            </a:r>
-            <a:r>
-              <a:rPr lang="en-US" sz="3200" dirty="0" err="1"/>
-              <a:t>kinesiological</a:t>
-            </a:r>
-            <a:r>
-              <a:rPr lang="en-US" sz="3200" dirty="0"/>
-              <a:t> robot arm control on novice user task </a:t>
-            </a:r>
-            <a:r>
-              <a:rPr lang="en-US" sz="3200" dirty="0"/>
-              <a:t>performance </a:t>
-            </a:r>
-            <a:r>
-              <a:rPr lang="en-US" sz="3200" dirty="0"/>
-              <a:t>and perception for tasks with/without 1-to-1 mappings?</a:t>
+              <a:t>What is the effect of kinesiological robot arm control on novice user task performance and perception for tasks with/without 1-to-1 mappings?</a:t>
             </a:r>
           </a:p>
           <a:p>
@@ -5935,40 +6930,16 @@
               <a:t>We hypothesize </a:t>
             </a:r>
             <a:r>
-              <a:rPr lang="en-US" sz="3200" dirty="0" err="1"/>
-              <a:t>kinesiological</a:t>
-            </a:r>
-            <a:r>
               <a:rPr lang="en-US" sz="3200" dirty="0"/>
-              <a:t> robot arm </a:t>
-            </a:r>
-            <a:r>
-              <a:rPr lang="en-US" sz="3200" dirty="0"/>
-              <a:t>control will have better task performance on tasks with 1-to-1 mappings, while joystick control</a:t>
+              <a:t>kinesiological robot arm control will have better task performance on tasks with 1-to-1 mappings, while joystick control</a:t>
             </a:r>
             <a:r>
               <a:rPr lang="en-US" sz="3200" kern="0" dirty="0"/>
               <a:t> will have better performance on tasks without 1-to-1 mappings. A combined control method will perform as well or better as </a:t>
             </a:r>
             <a:r>
-              <a:rPr lang="en-US" sz="3200" dirty="0" err="1"/>
-              <a:t>kinesiological</a:t>
-            </a:r>
-            <a:r>
               <a:rPr lang="en-US" sz="3200" dirty="0"/>
-              <a:t> </a:t>
-            </a:r>
-            <a:r>
-              <a:rPr lang="en-US" sz="3200" dirty="0"/>
-              <a:t>control for </a:t>
-            </a:r>
-            <a:r>
-              <a:rPr lang="en-US" sz="3200" dirty="0"/>
-              <a:t>tasks with 1-to-1 </a:t>
-            </a:r>
-            <a:r>
-              <a:rPr lang="en-US" sz="3200" dirty="0"/>
-              <a:t>mappings. Likewise, </a:t>
+              <a:t>kinesiological control for tasks with 1-to-1 mappings. Likewise, </a:t>
             </a:r>
             <a:r>
               <a:rPr lang="en-US" sz="3200" kern="0" dirty="0"/>
@@ -5984,23 +6955,7 @@
             </a:r>
             <a:r>
               <a:rPr lang="en-US" sz="3200" dirty="0"/>
-              <a:t>j</a:t>
-            </a:r>
-            <a:r>
-              <a:rPr lang="en-US" sz="3200" dirty="0"/>
-              <a:t>oystick </a:t>
-            </a:r>
-            <a:r>
-              <a:rPr lang="en-US" sz="3200" dirty="0"/>
-              <a:t>control for tasks </a:t>
-            </a:r>
-            <a:r>
-              <a:rPr lang="en-US" sz="3200" dirty="0"/>
-              <a:t>without </a:t>
-            </a:r>
-            <a:r>
-              <a:rPr lang="en-US" sz="3200" dirty="0"/>
-              <a:t>1-to-1 mappings. </a:t>
+              <a:t>joystick control for tasks without 1-to-1 mappings. </a:t>
             </a:r>
             <a:endParaRPr lang="en-US" sz="3200" kern="0" dirty="0"/>
           </a:p>
@@ -6010,35 +6965,23 @@
             </a:pPr>
             <a:r>
               <a:rPr lang="en-US" sz="3200" b="1" kern="0" dirty="0"/>
-              <a:t>(</a:t>
-            </a:r>
-            <a:r>
-              <a:rPr lang="en-US" sz="3200" b="1" kern="0" dirty="0"/>
-              <a:t>H2) User Perception – </a:t>
-            </a:r>
-            <a:r>
-              <a:rPr lang="en-US" sz="3200" kern="0" dirty="0"/>
-              <a:t>We </a:t>
-            </a:r>
-            <a:r>
-              <a:rPr lang="en-US" sz="3200" kern="0" dirty="0"/>
-              <a:t>hypothesize </a:t>
-            </a:r>
-            <a:r>
-              <a:rPr lang="en-US" sz="3200" kern="0" dirty="0"/>
-              <a:t>a combined control method will be perceived more favorably than either </a:t>
-            </a:r>
-            <a:r>
-              <a:rPr lang="en-US" sz="3200" dirty="0" err="1"/>
-              <a:t>kinesiological</a:t>
-            </a:r>
-            <a:r>
-              <a:rPr lang="en-US" sz="3200" dirty="0"/>
-              <a:t> </a:t>
-            </a:r>
-            <a:r>
-              <a:rPr lang="en-US" sz="3200" dirty="0"/>
-              <a:t>or joystick control.</a:t>
+              <a:t>(H2) User Perception – </a:t>
+            </a:r>
+            <a:r>
+              <a:rPr lang="en-US" sz="3200" kern="0" dirty="0" smtClean="0"/>
+              <a:t>We hypothesize the same relationships will be found as </a:t>
+            </a:r>
+            <a:r>
+              <a:rPr lang="en-US" sz="3200" b="1" kern="0" dirty="0" smtClean="0"/>
+              <a:t>H1</a:t>
+            </a:r>
+            <a:r>
+              <a:rPr lang="en-US" sz="3200" kern="0" dirty="0" smtClean="0"/>
+              <a:t> for perceptions of Ease of Use, Usefulness, and Enjoyment</a:t>
+            </a:r>
+            <a:r>
+              <a:rPr lang="en-US" sz="3200" dirty="0" smtClean="0"/>
+              <a:t>.</a:t>
             </a:r>
             <a:endParaRPr lang="en-US" sz="3200" kern="0" dirty="0"/>
           </a:p>
@@ -6076,7 +7019,7 @@
 </p:sld>
 </file>
 
-<file path=ppt/slides/slide4.xml><?xml version="1.0" encoding="utf-8"?>
+<file path=ppt/slides/slide6.xml><?xml version="1.0" encoding="utf-8"?>
 <p:sld xmlns:a="http://schemas.openxmlformats.org/drawingml/2006/main" xmlns:r="http://schemas.openxmlformats.org/officeDocument/2006/relationships" xmlns:p="http://schemas.openxmlformats.org/presentationml/2006/main">
   <p:cSld>
     <p:spTree>
@@ -6110,7 +7053,7 @@
           <a:p>
             <a:r>
               <a:rPr lang="en-US" dirty="0" smtClean="0"/>
-              <a:t>Experimental Design</a:t>
+              <a:t>System Design</a:t>
             </a:r>
             <a:endParaRPr lang="en-US" dirty="0"/>
           </a:p>
@@ -6126,7 +7069,12 @@
             <p:ph idx="1"/>
           </p:nvPr>
         </p:nvSpPr>
-        <p:spPr/>
+        <p:spPr>
+          <a:xfrm>
+            <a:off x="4978400" y="2552700"/>
+            <a:ext cx="7670800" cy="6845300"/>
+          </a:xfrm>
+        </p:spPr>
         <p:txBody>
           <a:bodyPr/>
           <a:lstStyle/>
@@ -6135,32 +7083,8 @@
               <a:defRPr/>
             </a:pPr>
             <a:r>
-              <a:rPr lang="en-US" sz="4000" dirty="0"/>
-              <a:t>We propose a 3x2 mixed-methods design to test our hypothesis (</a:t>
-            </a:r>
-            <a:r>
-              <a:rPr lang="en-US" sz="4000" i="1" dirty="0"/>
-              <a:t>control type</a:t>
-            </a:r>
-            <a:r>
-              <a:rPr lang="en-US" sz="4000" dirty="0"/>
-              <a:t> – between-participants, </a:t>
-            </a:r>
-            <a:r>
-              <a:rPr lang="en-US" sz="4000" i="1" dirty="0"/>
-              <a:t>task type</a:t>
-            </a:r>
-            <a:r>
-              <a:rPr lang="en-US" sz="4000" dirty="0"/>
-              <a:t> – within</a:t>
-            </a:r>
-            <a:r>
-              <a:rPr lang="en-US" sz="4000" dirty="0"/>
-              <a:t>-participants</a:t>
-            </a:r>
-            <a:r>
-              <a:rPr lang="en-US" sz="4000" dirty="0"/>
-              <a:t>):</a:t>
+              <a:rPr lang="en-US" sz="3200" dirty="0" smtClean="0"/>
+              <a:t>We implemented a kinesiological control method using a VML motion capture glove and a Microsoft Kinect.</a:t>
             </a:r>
           </a:p>
           <a:p>
@@ -6168,8 +7092,8 @@
               <a:defRPr/>
             </a:pPr>
             <a:r>
-              <a:rPr lang="en-US" sz="4000" dirty="0"/>
-              <a:t>Independent Variables:</a:t>
+              <a:rPr lang="en-US" sz="3200" dirty="0" smtClean="0"/>
+              <a:t>Position data was collected with the Kinect and hand orientation data was collected by the motion capture glove.</a:t>
             </a:r>
           </a:p>
           <a:p>
@@ -6177,36 +7101,8 @@
               <a:defRPr/>
             </a:pPr>
             <a:r>
-              <a:rPr lang="en-US" sz="4000" dirty="0"/>
-              <a:t>	</a:t>
-            </a:r>
-            <a:r>
-              <a:rPr lang="en-US" sz="3200" i="1" dirty="0"/>
-              <a:t>control type </a:t>
-            </a:r>
-            <a:r>
-              <a:rPr lang="el-GR" sz="3200" dirty="0"/>
-              <a:t>ϵ</a:t>
-            </a:r>
-            <a:r>
-              <a:rPr lang="en-US" sz="3200" dirty="0"/>
-              <a:t> {</a:t>
-            </a:r>
-            <a:r>
-              <a:rPr lang="en-US" sz="3200" dirty="0" err="1"/>
-              <a:t>kinesiological</a:t>
-            </a:r>
-            <a:r>
-              <a:rPr lang="en-US" sz="3200" dirty="0"/>
-              <a:t>, joystick, </a:t>
-            </a:r>
-            <a:r>
-              <a:rPr lang="en-US" sz="3200" dirty="0" err="1"/>
-              <a:t>kines</a:t>
-            </a:r>
-            <a:r>
-              <a:rPr lang="en-US" sz="3200" dirty="0"/>
-              <a:t>+}</a:t>
+              <a:rPr lang="en-US" sz="3200" dirty="0" smtClean="0"/>
+              <a:t>Position and orientation were combined into a target pose for the end effector of a robot arm.</a:t>
             </a:r>
           </a:p>
           <a:p>
@@ -6214,55 +7110,37 @@
               <a:defRPr/>
             </a:pPr>
             <a:r>
-              <a:rPr lang="en-US" sz="3200" dirty="0"/>
-              <a:t>	</a:t>
-            </a:r>
-            <a:r>
-              <a:rPr lang="en-US" sz="3200" i="1" dirty="0"/>
-              <a:t>task </a:t>
-            </a:r>
-            <a:r>
-              <a:rPr lang="en-US" sz="3200" i="1" dirty="0"/>
-              <a:t>type </a:t>
-            </a:r>
-            <a:r>
-              <a:rPr lang="el-GR" sz="3200" dirty="0"/>
-              <a:t>ϵ</a:t>
-            </a:r>
-            <a:r>
-              <a:rPr lang="en-US" sz="3200" dirty="0"/>
-              <a:t> </a:t>
-            </a:r>
-            <a:r>
-              <a:rPr lang="en-US" sz="3200" dirty="0"/>
-              <a:t>{1-to-1 mapping, no mapping}</a:t>
-            </a:r>
-          </a:p>
-          <a:p>
-            <a:pPr marL="0" indent="0" eaLnBrk="1" hangingPunct="1">
-              <a:defRPr/>
-            </a:pPr>
-            <a:r>
-              <a:rPr lang="en-US" sz="4000" dirty="0"/>
-              <a:t>Dependent Variables:</a:t>
-            </a:r>
-          </a:p>
-          <a:p>
-            <a:pPr marL="0" indent="0" eaLnBrk="1" hangingPunct="1">
-              <a:defRPr/>
-            </a:pPr>
-            <a:r>
-              <a:rPr lang="en-US" sz="4000" dirty="0"/>
-              <a:t>	</a:t>
-            </a:r>
-            <a:r>
-              <a:rPr lang="en-US" sz="3200" i="1" dirty="0"/>
-              <a:t>task completion time, task accuracy, subjective measures</a:t>
+              <a:rPr lang="en-US" sz="3200" dirty="0" smtClean="0"/>
+              <a:t>The target pose was sent to the robot arm using Robot Operating System (ROS)</a:t>
             </a:r>
             <a:endParaRPr lang="en-US" sz="3200" dirty="0"/>
           </a:p>
         </p:txBody>
       </p:sp>
+      <p:pic>
+        <p:nvPicPr>
+          <p:cNvPr id="4" name="Picture 3"/>
+          <p:cNvPicPr>
+            <a:picLocks noChangeAspect="1"/>
+          </p:cNvPicPr>
+          <p:nvPr/>
+        </p:nvPicPr>
+        <p:blipFill>
+          <a:blip r:embed="rId2"/>
+          <a:stretch>
+            <a:fillRect/>
+          </a:stretch>
+        </p:blipFill>
+        <p:spPr>
+          <a:xfrm>
+            <a:off x="558800" y="2552700"/>
+            <a:ext cx="4089400" cy="6818029"/>
+          </a:xfrm>
+          <a:prstGeom prst="rect">
+            <a:avLst/>
+          </a:prstGeom>
+        </p:spPr>
+      </p:pic>
     </p:spTree>
     <p:extLst>
       <p:ext uri="{BB962C8B-B14F-4D97-AF65-F5344CB8AC3E}">
@@ -6277,7 +7155,7 @@
 </p:sld>
 </file>
 
-<file path=ppt/slides/slide5.xml><?xml version="1.0" encoding="utf-8"?>
+<file path=ppt/slides/slide7.xml><?xml version="1.0" encoding="utf-8"?>
 <p:sld xmlns:a="http://schemas.openxmlformats.org/drawingml/2006/main" xmlns:r="http://schemas.openxmlformats.org/officeDocument/2006/relationships" xmlns:p="http://schemas.openxmlformats.org/presentationml/2006/main">
   <p:cSld>
     <p:spTree>
@@ -6311,7 +7189,7 @@
           <a:p>
             <a:r>
               <a:rPr lang="en-US" dirty="0" smtClean="0"/>
-              <a:t>Task &amp; Procedure</a:t>
+              <a:t>Experimental Design</a:t>
             </a:r>
             <a:endParaRPr lang="en-US" dirty="0"/>
           </a:p>
@@ -6332,82 +7210,135 @@
           <a:bodyPr/>
           <a:lstStyle/>
           <a:p>
-            <a:r>
-              <a:rPr lang="en-US" dirty="0" smtClean="0"/>
-              <a:t>Our experiment will have participants perform both task types with a robot arm (a </a:t>
-            </a:r>
-            <a:r>
-              <a:rPr lang="en-US" dirty="0" err="1" smtClean="0"/>
-              <a:t>Kinova</a:t>
-            </a:r>
-            <a:r>
-              <a:rPr lang="en-US" dirty="0" smtClean="0"/>
-              <a:t> </a:t>
-            </a:r>
-            <a:r>
-              <a:rPr lang="en-US" dirty="0" err="1" smtClean="0"/>
-              <a:t>Mico</a:t>
-            </a:r>
-            <a:r>
-              <a:rPr lang="en-US" dirty="0" smtClean="0"/>
-              <a:t> or </a:t>
-            </a:r>
-            <a:r>
-              <a:rPr lang="en-US" dirty="0" err="1" smtClean="0"/>
-              <a:t>PhantomX</a:t>
-            </a:r>
-            <a:r>
-              <a:rPr lang="en-US" dirty="0" smtClean="0"/>
-              <a:t> Reactor [</a:t>
-            </a:r>
-            <a:r>
-              <a:rPr lang="en-US" dirty="0" err="1" smtClean="0"/>
-              <a:t>tbd</a:t>
-            </a:r>
-            <a:r>
-              <a:rPr lang="en-US" dirty="0" smtClean="0"/>
-              <a:t>]; possibly simulated). The tasks will be a pick and place task (1-to-1 mapping) and an object rotation task (no 1-to-1 mapping).</a:t>
-            </a:r>
-          </a:p>
-          <a:p>
-            <a:r>
-              <a:rPr lang="en-US" dirty="0" smtClean="0"/>
-              <a:t>Each participant will only use 1 of the 3 control types. </a:t>
-            </a:r>
-            <a:r>
-              <a:rPr lang="en-US" dirty="0"/>
-              <a:t>The </a:t>
-            </a:r>
-            <a:r>
-              <a:rPr lang="en-US" dirty="0" err="1" smtClean="0"/>
-              <a:t>kinesiological</a:t>
-            </a:r>
-            <a:r>
-              <a:rPr lang="en-US" dirty="0" smtClean="0"/>
-              <a:t> method uses a Microsoft Kinect to track hand position.</a:t>
-            </a:r>
-          </a:p>
-          <a:p>
-            <a:r>
-              <a:rPr lang="en-US" dirty="0" smtClean="0"/>
-              <a:t>We plan to conduct the study in either the Visual Computing Lab or HCI lab (</a:t>
-            </a:r>
-            <a:r>
-              <a:rPr lang="en-US" dirty="0" err="1" smtClean="0"/>
-              <a:t>tbd</a:t>
-            </a:r>
-            <a:r>
-              <a:rPr lang="en-US" dirty="0" smtClean="0"/>
-              <a:t>).</a:t>
-            </a:r>
-            <a:endParaRPr lang="en-US" dirty="0"/>
+            <a:pPr marL="0" indent="0" eaLnBrk="1" hangingPunct="1">
+              <a:defRPr/>
+            </a:pPr>
+            <a:r>
+              <a:rPr lang="en-US" sz="4000" dirty="0"/>
+              <a:t>We </a:t>
+            </a:r>
+            <a:r>
+              <a:rPr lang="en-US" sz="4000" dirty="0" smtClean="0"/>
+              <a:t>designed a </a:t>
+            </a:r>
+            <a:r>
+              <a:rPr lang="en-US" sz="4000" dirty="0"/>
+              <a:t>3x2 mixed-methods </a:t>
+            </a:r>
+            <a:r>
+              <a:rPr lang="en-US" sz="4000" dirty="0" smtClean="0"/>
+              <a:t>study to </a:t>
+            </a:r>
+            <a:r>
+              <a:rPr lang="en-US" sz="4000" dirty="0"/>
+              <a:t>test our hypothesis (</a:t>
+            </a:r>
+            <a:r>
+              <a:rPr lang="en-US" sz="4000" i="1" dirty="0"/>
+              <a:t>control type</a:t>
+            </a:r>
+            <a:r>
+              <a:rPr lang="en-US" sz="4000" dirty="0"/>
+              <a:t> – between-participants, </a:t>
+            </a:r>
+            <a:r>
+              <a:rPr lang="en-US" sz="4000" i="1" dirty="0"/>
+              <a:t>task type</a:t>
+            </a:r>
+            <a:r>
+              <a:rPr lang="en-US" sz="4000" dirty="0"/>
+              <a:t> – within-participants):</a:t>
+            </a:r>
+          </a:p>
+          <a:p>
+            <a:pPr marL="0" indent="0" eaLnBrk="1" hangingPunct="1">
+              <a:defRPr/>
+            </a:pPr>
+            <a:r>
+              <a:rPr lang="en-US" sz="4000" dirty="0"/>
+              <a:t>Independent Variables:</a:t>
+            </a:r>
+          </a:p>
+          <a:p>
+            <a:pPr marL="0" indent="0" eaLnBrk="1" hangingPunct="1">
+              <a:defRPr/>
+            </a:pPr>
+            <a:r>
+              <a:rPr lang="en-US" sz="4000" dirty="0"/>
+              <a:t>	</a:t>
+            </a:r>
+            <a:r>
+              <a:rPr lang="en-US" sz="3200" i="1" dirty="0"/>
+              <a:t>control type </a:t>
+            </a:r>
+            <a:r>
+              <a:rPr lang="el-GR" sz="3200" dirty="0"/>
+              <a:t>ϵ</a:t>
+            </a:r>
+            <a:r>
+              <a:rPr lang="en-US" sz="3200" dirty="0"/>
+              <a:t> {kinesiological, joystick, </a:t>
+            </a:r>
+            <a:r>
+              <a:rPr lang="en-US" sz="3200" dirty="0" smtClean="0"/>
+              <a:t>kinesiological+}</a:t>
+            </a:r>
+            <a:endParaRPr lang="en-US" sz="3200" dirty="0"/>
+          </a:p>
+          <a:p>
+            <a:pPr marL="0" indent="0" eaLnBrk="1" hangingPunct="1">
+              <a:defRPr/>
+            </a:pPr>
+            <a:r>
+              <a:rPr lang="en-US" sz="3200" dirty="0"/>
+              <a:t>	</a:t>
+            </a:r>
+            <a:r>
+              <a:rPr lang="en-US" sz="3200" i="1" dirty="0"/>
+              <a:t>task type </a:t>
+            </a:r>
+            <a:r>
+              <a:rPr lang="el-GR" sz="3200" dirty="0"/>
+              <a:t>ϵ</a:t>
+            </a:r>
+            <a:r>
+              <a:rPr lang="en-US" sz="3200" dirty="0"/>
+              <a:t> {1-to-1 mapping, no mapping}</a:t>
+            </a:r>
+          </a:p>
+          <a:p>
+            <a:pPr marL="0" indent="0" eaLnBrk="1" hangingPunct="1">
+              <a:defRPr/>
+            </a:pPr>
+            <a:r>
+              <a:rPr lang="en-US" sz="4000" dirty="0"/>
+              <a:t>Dependent Variables:</a:t>
+            </a:r>
+          </a:p>
+          <a:p>
+            <a:pPr marL="0" indent="0" eaLnBrk="1" hangingPunct="1">
+              <a:defRPr/>
+            </a:pPr>
+            <a:r>
+              <a:rPr lang="en-US" sz="4000" dirty="0"/>
+              <a:t>	</a:t>
+            </a:r>
+            <a:r>
+              <a:rPr lang="en-US" sz="3200" i="1" dirty="0"/>
+              <a:t>task completion </a:t>
+            </a:r>
+            <a:r>
+              <a:rPr lang="en-US" sz="3200" i="1" dirty="0" smtClean="0"/>
+              <a:t>time, usefulness, ease of use, enjoyment</a:t>
+            </a:r>
+            <a:endParaRPr lang="en-US" sz="3200" dirty="0"/>
           </a:p>
         </p:txBody>
       </p:sp>
     </p:spTree>
     <p:extLst>
       <p:ext uri="{BB962C8B-B14F-4D97-AF65-F5344CB8AC3E}">
-        <p14:creationId xmlns:p14="http://schemas.microsoft.com/office/powerpoint/2010/main" val="3731478156"/>
+        <p14:creationId xmlns:p14="http://schemas.microsoft.com/office/powerpoint/2010/main" val="2009770456"/>
       </p:ext>
     </p:extLst>
   </p:cSld>
@@ -6418,7 +7349,7 @@
 </p:sld>
 </file>
 
-<file path=ppt/slides/slide6.xml><?xml version="1.0" encoding="utf-8"?>
+<file path=ppt/slides/slide8.xml><?xml version="1.0" encoding="utf-8"?>
 <p:sld xmlns:a="http://schemas.openxmlformats.org/drawingml/2006/main" xmlns:r="http://schemas.openxmlformats.org/officeDocument/2006/relationships" xmlns:p="http://schemas.openxmlformats.org/presentationml/2006/main">
   <p:cSld>
     <p:spTree>
@@ -6442,7 +7373,7 @@
             <a:spLocks noGrp="1"/>
           </p:cNvSpPr>
           <p:nvPr>
-            <p:ph type="ctrTitle"/>
+            <p:ph type="title"/>
           </p:nvPr>
         </p:nvSpPr>
         <p:spPr/>
@@ -6451,27 +7382,107 @@
           <a:lstStyle/>
           <a:p>
             <a:r>
-              <a:rPr lang="en-US" sz="13800" dirty="0"/>
-              <a:t>Questions?</a:t>
-            </a:r>
-            <a:endParaRPr lang="en-US" sz="13800" dirty="0"/>
+              <a:rPr lang="en-US" dirty="0" smtClean="0"/>
+              <a:t>Participants, &amp; Procedure</a:t>
+            </a:r>
+            <a:endParaRPr lang="en-US" dirty="0"/>
           </a:p>
         </p:txBody>
       </p:sp>
       <p:sp>
         <p:nvSpPr>
-          <p:cNvPr id="3" name="Subtitle 2"/>
+          <p:cNvPr id="3" name="Content Placeholder 2"/>
           <p:cNvSpPr>
             <a:spLocks noGrp="1"/>
           </p:cNvSpPr>
           <p:nvPr>
-            <p:ph type="subTitle" idx="1"/>
+            <p:ph idx="1"/>
+          </p:nvPr>
+        </p:nvSpPr>
+        <p:spPr/>
+        <p:txBody>
+          <a:bodyPr/>
+          <a:lstStyle/>
+          <a:p>
+            <a:r>
+              <a:rPr lang="en-US" dirty="0" smtClean="0"/>
+              <a:t>We used a Kinova Mico arm in the HCI lab to perform our study. Positions were captured with a Microsoft Kinect and hand orientation using a VML data glove.</a:t>
+            </a:r>
+          </a:p>
+          <a:p>
+            <a:r>
+              <a:rPr lang="en-US" dirty="0" smtClean="0"/>
+              <a:t>Participants performed a movement (1-to-1 mapping) and a rotation (no mapping) task using 1 control type.</a:t>
+            </a:r>
+          </a:p>
+          <a:p>
+            <a:r>
+              <a:rPr lang="en-US" dirty="0" smtClean="0"/>
+              <a:t>Participants were given an instruction sheet and unlimited practice time.</a:t>
+            </a:r>
+          </a:p>
+          <a:p>
+            <a:r>
+              <a:rPr lang="en-US" dirty="0" smtClean="0"/>
+              <a:t>10 males and 2 females aged 19-40 (M: 27.1, SD: 5.45) were recruited by convenience sampling. Robot familiarity was moderate (</a:t>
+            </a:r>
+            <a:r>
+              <a:rPr lang="en-US" dirty="0"/>
+              <a:t>M: </a:t>
+            </a:r>
+            <a:r>
+              <a:rPr lang="en-US" dirty="0" smtClean="0"/>
+              <a:t>4.25, SD: 1.86).</a:t>
+            </a:r>
+            <a:endParaRPr lang="en-US" dirty="0"/>
+          </a:p>
+        </p:txBody>
+      </p:sp>
+    </p:spTree>
+    <p:extLst>
+      <p:ext uri="{BB962C8B-B14F-4D97-AF65-F5344CB8AC3E}">
+        <p14:creationId xmlns:p14="http://schemas.microsoft.com/office/powerpoint/2010/main" val="3731478156"/>
+      </p:ext>
+    </p:extLst>
+  </p:cSld>
+  <p:clrMapOvr>
+    <a:masterClrMapping/>
+  </p:clrMapOvr>
+  <p:transition/>
+</p:sld>
+</file>
+
+<file path=ppt/slides/slide9.xml><?xml version="1.0" encoding="utf-8"?>
+<p:sld xmlns:a="http://schemas.openxmlformats.org/drawingml/2006/main" xmlns:r="http://schemas.openxmlformats.org/officeDocument/2006/relationships" xmlns:p="http://schemas.openxmlformats.org/presentationml/2006/main">
+  <p:cSld>
+    <p:spTree>
+      <p:nvGrpSpPr>
+        <p:cNvPr id="1" name=""/>
+        <p:cNvGrpSpPr/>
+        <p:nvPr/>
+      </p:nvGrpSpPr>
+      <p:grpSpPr>
+        <a:xfrm>
+          <a:off x="0" y="0"/>
+          <a:ext cx="0" cy="0"/>
+          <a:chOff x="0" y="0"/>
+          <a:chExt cx="0" cy="0"/>
+        </a:xfrm>
+      </p:grpSpPr>
+      <p:sp>
+        <p:nvSpPr>
+          <p:cNvPr id="2" name="Title 1"/>
+          <p:cNvSpPr>
+            <a:spLocks noGrp="1"/>
+          </p:cNvSpPr>
+          <p:nvPr>
+            <p:ph type="title"/>
           </p:nvPr>
         </p:nvSpPr>
         <p:spPr>
           <a:xfrm>
-            <a:off x="1951039" y="5070477"/>
-            <a:ext cx="9102725" cy="720723"/>
+            <a:off x="355600" y="152400"/>
+            <a:ext cx="12293600" cy="1079500"/>
           </a:xfrm>
         </p:spPr>
         <p:txBody>
@@ -6480,280 +7491,46 @@
           <a:p>
             <a:r>
               <a:rPr lang="en-US" dirty="0" smtClean="0"/>
-              <a:t>Thanks for listening!</a:t>
+              <a:t>Results</a:t>
             </a:r>
             <a:endParaRPr lang="en-US" dirty="0"/>
           </a:p>
         </p:txBody>
       </p:sp>
-      <p:sp>
-        <p:nvSpPr>
-          <p:cNvPr id="4" name="Rectangle 2"/>
-          <p:cNvSpPr txBox="1">
-            <a:spLocks noChangeArrowheads="1"/>
-          </p:cNvSpPr>
+      <p:pic>
+        <p:nvPicPr>
+          <p:cNvPr id="4" name="Picture 3"/>
+          <p:cNvPicPr>
+            <a:picLocks noChangeAspect="1"/>
+          </p:cNvPicPr>
           <p:nvPr/>
-        </p:nvSpPr>
-        <p:spPr bwMode="auto">
+        </p:nvPicPr>
+        <p:blipFill>
+          <a:blip r:embed="rId2">
+            <a:extLst>
+              <a:ext uri="{28A0092B-C50C-407E-A947-70E740481C1C}">
+                <a14:useLocalDpi xmlns:a14="http://schemas.microsoft.com/office/drawing/2010/main" val="0"/>
+              </a:ext>
+            </a:extLst>
+          </a:blip>
+          <a:stretch>
+            <a:fillRect/>
+          </a:stretch>
+        </p:blipFill>
+        <p:spPr>
           <a:xfrm>
-            <a:off x="1625600" y="6584950"/>
-            <a:ext cx="9753600" cy="2654300"/>
+            <a:off x="1244600" y="1231900"/>
+            <a:ext cx="10189282" cy="8284220"/>
           </a:xfrm>
           <a:prstGeom prst="rect">
             <a:avLst/>
           </a:prstGeom>
-          <a:noFill/>
-          <a:ln>
-            <a:noFill/>
-          </a:ln>
-          <a:effectLst/>
-          <a:extLst>
-            <a:ext uri="{909E8E84-426E-40dd-AFC4-6F175D3DCCD1}">
-              <a14:hiddenFill xmlns:a14="http://schemas.microsoft.com/office/drawing/2010/main" xmlns="">
-                <a:solidFill>
-                  <a:srgbClr val="FFFFFF"/>
-                </a:solidFill>
-              </a14:hiddenFill>
-            </a:ext>
-            <a:ext uri="{91240B29-F687-4f45-9708-019B960494DF}">
-              <a14:hiddenLine xmlns:a14="http://schemas.microsoft.com/office/drawing/2010/main" xmlns="" w="12700">
-                <a:solidFill>
-                  <a:srgbClr val="000000"/>
-                </a:solidFill>
-                <a:miter lim="800000"/>
-                <a:headEnd/>
-                <a:tailEnd/>
-              </a14:hiddenLine>
-            </a:ext>
-            <a:ext uri="{AF507438-7753-43e0-B8FC-AC1667EBCBE1}">
-              <a14:hiddenEffects xmlns:a14="http://schemas.microsoft.com/office/drawing/2010/main" xmlns="">
-                <a:effectLst>
-                  <a:outerShdw blurRad="63500" dist="38099" dir="2700000" algn="ctr" rotWithShape="0">
-                    <a:srgbClr val="000000">
-                      <a:alpha val="74998"/>
-                    </a:srgbClr>
-                  </a:outerShdw>
-                </a:effectLst>
-              </a14:hiddenEffects>
-            </a:ext>
-            <a:ext uri="{FAA26D3D-D897-4be2-8F04-BA451C77F1D7}">
-              <ma14:placeholderFlag xmlns:ma14="http://schemas.microsoft.com/office/mac/drawingml/2011/main" xmlns="" val="1"/>
-            </a:ext>
-          </a:extLst>
         </p:spPr>
-        <p:txBody>
-          <a:bodyPr vert="horz" wrap="square" lIns="50800" tIns="50800" rIns="50800" bIns="50800" numCol="1" anchor="t" anchorCtr="0" compatLnSpc="1">
-            <a:prstTxWarp prst="textNoShape">
-              <a:avLst/>
-            </a:prstTxWarp>
-          </a:bodyPr>
-          <a:lstStyle>
-            <a:lvl1pPr marL="0" indent="0" algn="ctr" rtl="0" eaLnBrk="0" fontAlgn="base" hangingPunct="0">
-              <a:spcBef>
-                <a:spcPct val="0"/>
-              </a:spcBef>
-              <a:spcAft>
-                <a:spcPct val="0"/>
-              </a:spcAft>
-              <a:buNone/>
-              <a:defRPr sz="3800">
-                <a:solidFill>
-                  <a:schemeClr val="tx1"/>
-                </a:solidFill>
-                <a:latin typeface="+mn-lt"/>
-                <a:ea typeface="+mn-ea"/>
-                <a:cs typeface="+mn-cs"/>
-                <a:sym typeface="Gill Sans Light" charset="0"/>
-              </a:defRPr>
-            </a:lvl1pPr>
-            <a:lvl2pPr marL="457200" indent="0" algn="ctr" rtl="0" eaLnBrk="0" fontAlgn="base" hangingPunct="0">
-              <a:spcBef>
-                <a:spcPct val="0"/>
-              </a:spcBef>
-              <a:spcAft>
-                <a:spcPct val="0"/>
-              </a:spcAft>
-              <a:buNone/>
-              <a:defRPr sz="3200">
-                <a:solidFill>
-                  <a:schemeClr val="tx1"/>
-                </a:solidFill>
-                <a:latin typeface="+mn-lt"/>
-                <a:ea typeface="+mn-ea"/>
-                <a:cs typeface="+mn-cs"/>
-                <a:sym typeface="Gill Sans Light" charset="0"/>
-              </a:defRPr>
-            </a:lvl2pPr>
-            <a:lvl3pPr marL="914400" indent="0" algn="ctr" rtl="0" eaLnBrk="0" fontAlgn="base" hangingPunct="0">
-              <a:spcBef>
-                <a:spcPct val="0"/>
-              </a:spcBef>
-              <a:spcAft>
-                <a:spcPct val="0"/>
-              </a:spcAft>
-              <a:buNone/>
-              <a:defRPr sz="2800">
-                <a:solidFill>
-                  <a:schemeClr val="tx1"/>
-                </a:solidFill>
-                <a:latin typeface="+mn-lt"/>
-                <a:ea typeface="+mn-ea"/>
-                <a:cs typeface="+mn-cs"/>
-                <a:sym typeface="Gill Sans Light" charset="0"/>
-              </a:defRPr>
-            </a:lvl3pPr>
-            <a:lvl4pPr marL="1371600" indent="0" algn="ctr" rtl="0" eaLnBrk="0" fontAlgn="base" hangingPunct="0">
-              <a:spcBef>
-                <a:spcPct val="0"/>
-              </a:spcBef>
-              <a:spcAft>
-                <a:spcPct val="0"/>
-              </a:spcAft>
-              <a:buNone/>
-              <a:defRPr sz="2400">
-                <a:solidFill>
-                  <a:schemeClr val="tx1"/>
-                </a:solidFill>
-                <a:latin typeface="+mn-lt"/>
-                <a:ea typeface="+mn-ea"/>
-                <a:cs typeface="+mn-cs"/>
-                <a:sym typeface="Gill Sans Light" charset="0"/>
-              </a:defRPr>
-            </a:lvl4pPr>
-            <a:lvl5pPr marL="1828800" indent="0" algn="ctr" rtl="0" eaLnBrk="0" fontAlgn="base" hangingPunct="0">
-              <a:spcBef>
-                <a:spcPct val="0"/>
-              </a:spcBef>
-              <a:spcAft>
-                <a:spcPct val="0"/>
-              </a:spcAft>
-              <a:buNone/>
-              <a:defRPr sz="2400">
-                <a:solidFill>
-                  <a:schemeClr val="tx1"/>
-                </a:solidFill>
-                <a:latin typeface="+mn-lt"/>
-                <a:ea typeface="+mn-ea"/>
-                <a:cs typeface="+mn-cs"/>
-                <a:sym typeface="Gill Sans Light" charset="0"/>
-              </a:defRPr>
-            </a:lvl5pPr>
-            <a:lvl6pPr marL="2286000" indent="0" algn="ctr" rtl="0" fontAlgn="base">
-              <a:spcBef>
-                <a:spcPct val="0"/>
-              </a:spcBef>
-              <a:spcAft>
-                <a:spcPct val="0"/>
-              </a:spcAft>
-              <a:buNone/>
-              <a:defRPr sz="2400">
-                <a:solidFill>
-                  <a:schemeClr val="tx1"/>
-                </a:solidFill>
-                <a:latin typeface="+mn-lt"/>
-                <a:ea typeface="+mn-ea"/>
-                <a:cs typeface="+mn-cs"/>
-                <a:sym typeface="Gill Sans Light" charset="0"/>
-              </a:defRPr>
-            </a:lvl6pPr>
-            <a:lvl7pPr marL="2743200" indent="0" algn="ctr" rtl="0" fontAlgn="base">
-              <a:spcBef>
-                <a:spcPct val="0"/>
-              </a:spcBef>
-              <a:spcAft>
-                <a:spcPct val="0"/>
-              </a:spcAft>
-              <a:buNone/>
-              <a:defRPr sz="2400">
-                <a:solidFill>
-                  <a:schemeClr val="tx1"/>
-                </a:solidFill>
-                <a:latin typeface="+mn-lt"/>
-                <a:ea typeface="+mn-ea"/>
-                <a:cs typeface="+mn-cs"/>
-                <a:sym typeface="Gill Sans Light" charset="0"/>
-              </a:defRPr>
-            </a:lvl7pPr>
-            <a:lvl8pPr marL="3200400" indent="0" algn="ctr" rtl="0" fontAlgn="base">
-              <a:spcBef>
-                <a:spcPct val="0"/>
-              </a:spcBef>
-              <a:spcAft>
-                <a:spcPct val="0"/>
-              </a:spcAft>
-              <a:buNone/>
-              <a:defRPr sz="2400">
-                <a:solidFill>
-                  <a:schemeClr val="tx1"/>
-                </a:solidFill>
-                <a:latin typeface="+mn-lt"/>
-                <a:ea typeface="+mn-ea"/>
-                <a:cs typeface="+mn-cs"/>
-                <a:sym typeface="Gill Sans Light" charset="0"/>
-              </a:defRPr>
-            </a:lvl8pPr>
-            <a:lvl9pPr marL="3657600" indent="0" algn="ctr" rtl="0" fontAlgn="base">
-              <a:spcBef>
-                <a:spcPct val="0"/>
-              </a:spcBef>
-              <a:spcAft>
-                <a:spcPct val="0"/>
-              </a:spcAft>
-              <a:buNone/>
-              <a:defRPr sz="2400">
-                <a:solidFill>
-                  <a:schemeClr val="tx1"/>
-                </a:solidFill>
-                <a:latin typeface="+mn-lt"/>
-                <a:ea typeface="+mn-ea"/>
-                <a:cs typeface="+mn-cs"/>
-                <a:sym typeface="Gill Sans Light" charset="0"/>
-              </a:defRPr>
-            </a:lvl9pPr>
-          </a:lstStyle>
-          <a:p>
-            <a:pPr eaLnBrk="1" hangingPunct="1"/>
-            <a:r>
-              <a:rPr lang="en-US" altLang="en-US" sz="3200" i="1" kern="0" smtClean="0"/>
-              <a:t>Danny Rakita, Alper Sarikaya, Christopher Bodden</a:t>
-            </a:r>
-            <a:br>
-              <a:rPr lang="en-US" altLang="en-US" sz="3200" i="1" kern="0" smtClean="0"/>
-            </a:br>
-            <a:r>
-              <a:rPr lang="en-US" altLang="en-US" sz="2400" i="1" kern="0" smtClean="0"/>
-              <a:t>Department of Computer Sciences</a:t>
-            </a:r>
-          </a:p>
-          <a:p>
-            <a:pPr marL="0" lvl="2" eaLnBrk="1" hangingPunct="1"/>
-            <a:r>
-              <a:rPr lang="en-US" altLang="en-US" sz="2400" i="1" kern="0" smtClean="0"/>
-              <a:t>University of Wisconsin–Madison</a:t>
-            </a:r>
-          </a:p>
-          <a:p>
-            <a:pPr marL="0" lvl="3" eaLnBrk="1" hangingPunct="1"/>
-            <a:endParaRPr lang="en-US" altLang="en-US" kern="0" smtClean="0"/>
-          </a:p>
-          <a:p>
-            <a:pPr marL="0" lvl="3" eaLnBrk="1" hangingPunct="1"/>
-            <a:endParaRPr lang="en-US" altLang="en-US" kern="0" smtClean="0"/>
-          </a:p>
-          <a:p>
-            <a:pPr marL="0" lvl="3" eaLnBrk="1" hangingPunct="1"/>
-            <a:r>
-              <a:rPr lang="en-US" altLang="en-US" kern="0" smtClean="0"/>
-              <a:t>CS/Psych-770 Human-Computer Interaction</a:t>
-            </a:r>
-            <a:endParaRPr lang="en-US" altLang="en-US" kern="0" dirty="0" smtClean="0"/>
-          </a:p>
-        </p:txBody>
-      </p:sp>
+      </p:pic>
     </p:spTree>
     <p:extLst>
       <p:ext uri="{BB962C8B-B14F-4D97-AF65-F5344CB8AC3E}">
-        <p14:creationId xmlns:p14="http://schemas.microsoft.com/office/powerpoint/2010/main" val="3318887079"/>
+        <p14:creationId xmlns:p14="http://schemas.microsoft.com/office/powerpoint/2010/main" val="1885729853"/>
       </p:ext>
     </p:extLst>
   </p:cSld>

</xml_diff>